<commit_message>
Deux premières leçons sur le chauffage et l'ecs
</commit_message>
<xml_diff>
--- a/_site/datafiles/ENER902 enjeux énergétiques.pptx
+++ b/_site/datafiles/ENER902 enjeux énergétiques.pptx
@@ -13,7 +13,6 @@
     <p:sldId id="261" r:id="rId8"/>
     <p:sldId id="262" r:id="rId9"/>
     <p:sldId id="263" r:id="rId10"/>
-    <p:sldId id="264" r:id="rId11"/>
   </p:sldIdLst>
   <p:sldSz cx="9144000" cy="6858000"/>
   <p:notesSz cx="7559675" cy="10691812"/>
@@ -1595,7 +1594,7 @@
                 <a:spcPct val="100000"/>
               </a:lnSpc>
             </a:pPr>
-            <a:fld id="{5042EC1A-1457-4911-A8F6-B205974B89D2}" type="slidenum">
+            <a:fld id="{DC435F5A-E359-4511-8CBE-62C71CF9E966}" type="slidenum">
               <a:rPr b="0" lang="fr-FR" sz="1400" spc="-1" strike="noStrike">
                 <a:solidFill>
                   <a:srgbClr val="000000"/>
@@ -1639,7 +1638,394 @@
                 </a:solidFill>
                 <a:latin typeface="Arial"/>
               </a:rPr>
-              <a:t>Cliquez pour éditer le format du texte-titre</a:t>
+              <a:t>C</a:t>
+            </a:r>
+            <a:r>
+              <a:rPr b="0" lang="fr-FR" sz="4400" spc="-1" strike="noStrike">
+                <a:solidFill>
+                  <a:srgbClr val="000000"/>
+                </a:solidFill>
+                <a:latin typeface="Arial"/>
+              </a:rPr>
+              <a:t>l</a:t>
+            </a:r>
+            <a:r>
+              <a:rPr b="0" lang="fr-FR" sz="4400" spc="-1" strike="noStrike">
+                <a:solidFill>
+                  <a:srgbClr val="000000"/>
+                </a:solidFill>
+                <a:latin typeface="Arial"/>
+              </a:rPr>
+              <a:t>i</a:t>
+            </a:r>
+            <a:r>
+              <a:rPr b="0" lang="fr-FR" sz="4400" spc="-1" strike="noStrike">
+                <a:solidFill>
+                  <a:srgbClr val="000000"/>
+                </a:solidFill>
+                <a:latin typeface="Arial"/>
+              </a:rPr>
+              <a:t>q</a:t>
+            </a:r>
+            <a:r>
+              <a:rPr b="0" lang="fr-FR" sz="4400" spc="-1" strike="noStrike">
+                <a:solidFill>
+                  <a:srgbClr val="000000"/>
+                </a:solidFill>
+                <a:latin typeface="Arial"/>
+              </a:rPr>
+              <a:t>u</a:t>
+            </a:r>
+            <a:r>
+              <a:rPr b="0" lang="fr-FR" sz="4400" spc="-1" strike="noStrike">
+                <a:solidFill>
+                  <a:srgbClr val="000000"/>
+                </a:solidFill>
+                <a:latin typeface="Arial"/>
+              </a:rPr>
+              <a:t>e</a:t>
+            </a:r>
+            <a:r>
+              <a:rPr b="0" lang="fr-FR" sz="4400" spc="-1" strike="noStrike">
+                <a:solidFill>
+                  <a:srgbClr val="000000"/>
+                </a:solidFill>
+                <a:latin typeface="Arial"/>
+              </a:rPr>
+              <a:t>z</a:t>
+            </a:r>
+            <a:r>
+              <a:rPr b="0" lang="fr-FR" sz="4400" spc="-1" strike="noStrike">
+                <a:solidFill>
+                  <a:srgbClr val="000000"/>
+                </a:solidFill>
+                <a:latin typeface="Arial"/>
+              </a:rPr>
+              <a:t> </a:t>
+            </a:r>
+            <a:r>
+              <a:rPr b="0" lang="fr-FR" sz="4400" spc="-1" strike="noStrike">
+                <a:solidFill>
+                  <a:srgbClr val="000000"/>
+                </a:solidFill>
+                <a:latin typeface="Arial"/>
+              </a:rPr>
+              <a:t>p</a:t>
+            </a:r>
+            <a:r>
+              <a:rPr b="0" lang="fr-FR" sz="4400" spc="-1" strike="noStrike">
+                <a:solidFill>
+                  <a:srgbClr val="000000"/>
+                </a:solidFill>
+                <a:latin typeface="Arial"/>
+              </a:rPr>
+              <a:t>o</a:t>
+            </a:r>
+            <a:r>
+              <a:rPr b="0" lang="fr-FR" sz="4400" spc="-1" strike="noStrike">
+                <a:solidFill>
+                  <a:srgbClr val="000000"/>
+                </a:solidFill>
+                <a:latin typeface="Arial"/>
+              </a:rPr>
+              <a:t>u</a:t>
+            </a:r>
+            <a:r>
+              <a:rPr b="0" lang="fr-FR" sz="4400" spc="-1" strike="noStrike">
+                <a:solidFill>
+                  <a:srgbClr val="000000"/>
+                </a:solidFill>
+                <a:latin typeface="Arial"/>
+              </a:rPr>
+              <a:t>r</a:t>
+            </a:r>
+            <a:r>
+              <a:rPr b="0" lang="fr-FR" sz="4400" spc="-1" strike="noStrike">
+                <a:solidFill>
+                  <a:srgbClr val="000000"/>
+                </a:solidFill>
+                <a:latin typeface="Arial"/>
+              </a:rPr>
+              <a:t> </a:t>
+            </a:r>
+            <a:r>
+              <a:rPr b="0" lang="fr-FR" sz="4400" spc="-1" strike="noStrike">
+                <a:solidFill>
+                  <a:srgbClr val="000000"/>
+                </a:solidFill>
+                <a:latin typeface="Arial"/>
+              </a:rPr>
+              <a:t>é</a:t>
+            </a:r>
+            <a:r>
+              <a:rPr b="0" lang="fr-FR" sz="4400" spc="-1" strike="noStrike">
+                <a:solidFill>
+                  <a:srgbClr val="000000"/>
+                </a:solidFill>
+                <a:latin typeface="Arial"/>
+              </a:rPr>
+              <a:t>d</a:t>
+            </a:r>
+            <a:r>
+              <a:rPr b="0" lang="fr-FR" sz="4400" spc="-1" strike="noStrike">
+                <a:solidFill>
+                  <a:srgbClr val="000000"/>
+                </a:solidFill>
+                <a:latin typeface="Arial"/>
+              </a:rPr>
+              <a:t>i</a:t>
+            </a:r>
+            <a:r>
+              <a:rPr b="0" lang="fr-FR" sz="4400" spc="-1" strike="noStrike">
+                <a:solidFill>
+                  <a:srgbClr val="000000"/>
+                </a:solidFill>
+                <a:latin typeface="Arial"/>
+              </a:rPr>
+              <a:t>t</a:t>
+            </a:r>
+            <a:r>
+              <a:rPr b="0" lang="fr-FR" sz="4400" spc="-1" strike="noStrike">
+                <a:solidFill>
+                  <a:srgbClr val="000000"/>
+                </a:solidFill>
+                <a:latin typeface="Arial"/>
+              </a:rPr>
+              <a:t>e</a:t>
+            </a:r>
+            <a:r>
+              <a:rPr b="0" lang="fr-FR" sz="4400" spc="-1" strike="noStrike">
+                <a:solidFill>
+                  <a:srgbClr val="000000"/>
+                </a:solidFill>
+                <a:latin typeface="Arial"/>
+              </a:rPr>
+              <a:t>r</a:t>
+            </a:r>
+            <a:r>
+              <a:rPr b="0" lang="fr-FR" sz="4400" spc="-1" strike="noStrike">
+                <a:solidFill>
+                  <a:srgbClr val="000000"/>
+                </a:solidFill>
+                <a:latin typeface="Arial"/>
+              </a:rPr>
+              <a:t> </a:t>
+            </a:r>
+            <a:r>
+              <a:rPr b="0" lang="fr-FR" sz="4400" spc="-1" strike="noStrike">
+                <a:solidFill>
+                  <a:srgbClr val="000000"/>
+                </a:solidFill>
+                <a:latin typeface="Arial"/>
+              </a:rPr>
+              <a:t>l</a:t>
+            </a:r>
+            <a:r>
+              <a:rPr b="0" lang="fr-FR" sz="4400" spc="-1" strike="noStrike">
+                <a:solidFill>
+                  <a:srgbClr val="000000"/>
+                </a:solidFill>
+                <a:latin typeface="Arial"/>
+              </a:rPr>
+              <a:t>e</a:t>
+            </a:r>
+            <a:r>
+              <a:rPr b="0" lang="fr-FR" sz="4400" spc="-1" strike="noStrike">
+                <a:solidFill>
+                  <a:srgbClr val="000000"/>
+                </a:solidFill>
+                <a:latin typeface="Arial"/>
+              </a:rPr>
+              <a:t> </a:t>
+            </a:r>
+            <a:r>
+              <a:rPr b="0" lang="fr-FR" sz="4400" spc="-1" strike="noStrike">
+                <a:solidFill>
+                  <a:srgbClr val="000000"/>
+                </a:solidFill>
+                <a:latin typeface="Arial"/>
+              </a:rPr>
+              <a:t>f</a:t>
+            </a:r>
+            <a:r>
+              <a:rPr b="0" lang="fr-FR" sz="4400" spc="-1" strike="noStrike">
+                <a:solidFill>
+                  <a:srgbClr val="000000"/>
+                </a:solidFill>
+                <a:latin typeface="Arial"/>
+              </a:rPr>
+              <a:t>o</a:t>
+            </a:r>
+            <a:r>
+              <a:rPr b="0" lang="fr-FR" sz="4400" spc="-1" strike="noStrike">
+                <a:solidFill>
+                  <a:srgbClr val="000000"/>
+                </a:solidFill>
+                <a:latin typeface="Arial"/>
+              </a:rPr>
+              <a:t>r</a:t>
+            </a:r>
+            <a:r>
+              <a:rPr b="0" lang="fr-FR" sz="4400" spc="-1" strike="noStrike">
+                <a:solidFill>
+                  <a:srgbClr val="000000"/>
+                </a:solidFill>
+                <a:latin typeface="Arial"/>
+              </a:rPr>
+              <a:t>m</a:t>
+            </a:r>
+            <a:r>
+              <a:rPr b="0" lang="fr-FR" sz="4400" spc="-1" strike="noStrike">
+                <a:solidFill>
+                  <a:srgbClr val="000000"/>
+                </a:solidFill>
+                <a:latin typeface="Arial"/>
+              </a:rPr>
+              <a:t>a</a:t>
+            </a:r>
+            <a:r>
+              <a:rPr b="0" lang="fr-FR" sz="4400" spc="-1" strike="noStrike">
+                <a:solidFill>
+                  <a:srgbClr val="000000"/>
+                </a:solidFill>
+                <a:latin typeface="Arial"/>
+              </a:rPr>
+              <a:t>t</a:t>
+            </a:r>
+            <a:r>
+              <a:rPr b="0" lang="fr-FR" sz="4400" spc="-1" strike="noStrike">
+                <a:solidFill>
+                  <a:srgbClr val="000000"/>
+                </a:solidFill>
+                <a:latin typeface="Arial"/>
+              </a:rPr>
+              <a:t> </a:t>
+            </a:r>
+            <a:r>
+              <a:rPr b="0" lang="fr-FR" sz="4400" spc="-1" strike="noStrike">
+                <a:solidFill>
+                  <a:srgbClr val="000000"/>
+                </a:solidFill>
+                <a:latin typeface="Arial"/>
+              </a:rPr>
+              <a:t>d</a:t>
+            </a:r>
+            <a:r>
+              <a:rPr b="0" lang="fr-FR" sz="4400" spc="-1" strike="noStrike">
+                <a:solidFill>
+                  <a:srgbClr val="000000"/>
+                </a:solidFill>
+                <a:latin typeface="Arial"/>
+              </a:rPr>
+              <a:t>u</a:t>
+            </a:r>
+            <a:r>
+              <a:rPr b="0" lang="fr-FR" sz="4400" spc="-1" strike="noStrike">
+                <a:solidFill>
+                  <a:srgbClr val="000000"/>
+                </a:solidFill>
+                <a:latin typeface="Arial"/>
+              </a:rPr>
+              <a:t> </a:t>
+            </a:r>
+            <a:r>
+              <a:rPr b="0" lang="fr-FR" sz="4400" spc="-1" strike="noStrike">
+                <a:solidFill>
+                  <a:srgbClr val="000000"/>
+                </a:solidFill>
+                <a:latin typeface="Arial"/>
+              </a:rPr>
+              <a:t>t</a:t>
+            </a:r>
+            <a:r>
+              <a:rPr b="0" lang="fr-FR" sz="4400" spc="-1" strike="noStrike">
+                <a:solidFill>
+                  <a:srgbClr val="000000"/>
+                </a:solidFill>
+                <a:latin typeface="Arial"/>
+              </a:rPr>
+              <a:t>e</a:t>
+            </a:r>
+            <a:r>
+              <a:rPr b="0" lang="fr-FR" sz="4400" spc="-1" strike="noStrike">
+                <a:solidFill>
+                  <a:srgbClr val="000000"/>
+                </a:solidFill>
+                <a:latin typeface="Arial"/>
+              </a:rPr>
+              <a:t>x</a:t>
+            </a:r>
+            <a:r>
+              <a:rPr b="0" lang="fr-FR" sz="4400" spc="-1" strike="noStrike">
+                <a:solidFill>
+                  <a:srgbClr val="000000"/>
+                </a:solidFill>
+                <a:latin typeface="Arial"/>
+              </a:rPr>
+              <a:t>t</a:t>
+            </a:r>
+            <a:r>
+              <a:rPr b="0" lang="fr-FR" sz="4400" spc="-1" strike="noStrike">
+                <a:solidFill>
+                  <a:srgbClr val="000000"/>
+                </a:solidFill>
+                <a:latin typeface="Arial"/>
+              </a:rPr>
+              <a:t>e</a:t>
+            </a:r>
+            <a:r>
+              <a:rPr b="0" lang="fr-FR" sz="4400" spc="-1" strike="noStrike">
+                <a:solidFill>
+                  <a:srgbClr val="000000"/>
+                </a:solidFill>
+                <a:latin typeface="Arial"/>
+              </a:rPr>
+              <a:t>-</a:t>
+            </a:r>
+            <a:r>
+              <a:rPr b="0" lang="fr-FR" sz="4400" spc="-1" strike="noStrike">
+                <a:solidFill>
+                  <a:srgbClr val="000000"/>
+                </a:solidFill>
+                <a:latin typeface="Arial"/>
+              </a:rPr>
+              <a:t>t</a:t>
+            </a:r>
+            <a:r>
+              <a:rPr b="0" lang="fr-FR" sz="4400" spc="-1" strike="noStrike">
+                <a:solidFill>
+                  <a:srgbClr val="000000"/>
+                </a:solidFill>
+                <a:latin typeface="Arial"/>
+              </a:rPr>
+              <a:t>i</a:t>
+            </a:r>
+            <a:r>
+              <a:rPr b="0" lang="fr-FR" sz="4400" spc="-1" strike="noStrike">
+                <a:solidFill>
+                  <a:srgbClr val="000000"/>
+                </a:solidFill>
+                <a:latin typeface="Arial"/>
+              </a:rPr>
+              <a:t>t</a:t>
+            </a:r>
+            <a:r>
+              <a:rPr b="0" lang="fr-FR" sz="4400" spc="-1" strike="noStrike">
+                <a:solidFill>
+                  <a:srgbClr val="000000"/>
+                </a:solidFill>
+                <a:latin typeface="Arial"/>
+              </a:rPr>
+              <a:t>r</a:t>
+            </a:r>
+            <a:r>
+              <a:rPr b="0" lang="fr-FR" sz="4400" spc="-1" strike="noStrike">
+                <a:solidFill>
+                  <a:srgbClr val="000000"/>
+                </a:solidFill>
+                <a:latin typeface="Arial"/>
+              </a:rPr>
+              <a:t>e</a:t>
             </a:r>
             <a:endParaRPr b="0" lang="fr-FR" sz="4400" spc="-1" strike="noStrike">
               <a:solidFill>
@@ -2171,14 +2557,14 @@
                 <a:spcPct val="100000"/>
               </a:lnSpc>
             </a:pPr>
-            <a:fld id="{A10D4F9C-9817-488F-8F2D-D4097C1229E1}" type="slidenum">
+            <a:fld id="{8CD93CA4-56B5-4834-B389-D1506E7B09EE}" type="slidenum">
               <a:rPr b="0" lang="fr-FR" sz="1400" spc="-1" strike="noStrike">
                 <a:solidFill>
                   <a:srgbClr val="000000"/>
                 </a:solidFill>
                 <a:latin typeface="Times New Roman"/>
               </a:rPr>
-              <a:t>&lt;numéro&gt;</a:t>
+              <a:t>1</a:t>
             </a:fld>
             <a:endParaRPr b="0" lang="fr-FR" sz="1400" spc="-1" strike="noStrike">
               <a:latin typeface="Times New Roman"/>
@@ -4004,14 +4390,14 @@
                 <a:spcPct val="100000"/>
               </a:lnSpc>
             </a:pPr>
-            <a:fld id="{271B7576-6878-4DA1-9C4B-9962C70CBA2F}" type="slidenum">
+            <a:fld id="{FC058568-0BA1-466C-AB72-8233DB5CE850}" type="slidenum">
               <a:rPr b="0" lang="fr-FR" sz="1400" spc="-1" strike="noStrike">
                 <a:solidFill>
                   <a:srgbClr val="000000"/>
                 </a:solidFill>
                 <a:latin typeface="Times New Roman"/>
               </a:rPr>
-              <a:t>&lt;numéro&gt;</a:t>
+              <a:t>1</a:t>
             </a:fld>
             <a:endParaRPr b="0" lang="fr-FR" sz="1400" spc="-1" strike="noStrike">
               <a:latin typeface="Times New Roman"/>
@@ -4855,14 +5241,14 @@
                 <a:spcPct val="100000"/>
               </a:lnSpc>
             </a:pPr>
-            <a:fld id="{185AD5C7-845D-472F-B757-FC7E298B8B9F}" type="slidenum">
+            <a:fld id="{AE19D6E5-9787-49B6-BFCC-CC8C0BEA3628}" type="slidenum">
               <a:rPr b="0" lang="fr-FR" sz="1400" spc="-1" strike="noStrike">
                 <a:solidFill>
                   <a:srgbClr val="000000"/>
                 </a:solidFill>
                 <a:latin typeface="Times New Roman"/>
               </a:rPr>
-              <a:t>&lt;numéro&gt;</a:t>
+              <a:t>1</a:t>
             </a:fld>
             <a:endParaRPr b="0" lang="fr-FR" sz="1400" spc="-1" strike="noStrike">
               <a:latin typeface="Times New Roman"/>
@@ -5029,14 +5415,14 @@
                 <a:spcPct val="100000"/>
               </a:lnSpc>
             </a:pPr>
-            <a:fld id="{C436C172-72B7-401B-B83E-0B723C1BC2A1}" type="slidenum">
+            <a:fld id="{909F31FA-CCBA-4636-BB21-64D0EA1A8BA0}" type="slidenum">
               <a:rPr b="0" lang="fr-FR" sz="1400" spc="-1" strike="noStrike">
                 <a:solidFill>
                   <a:srgbClr val="000000"/>
                 </a:solidFill>
                 <a:latin typeface="Times New Roman"/>
               </a:rPr>
-              <a:t>&lt;numéro&gt;</a:t>
+              <a:t>1</a:t>
             </a:fld>
             <a:endParaRPr b="0" lang="fr-FR" sz="1400" spc="-1" strike="noStrike">
               <a:latin typeface="Times New Roman"/>
@@ -7619,14 +8005,14 @@
                 <a:spcPct val="100000"/>
               </a:lnSpc>
             </a:pPr>
-            <a:fld id="{06E44415-44D9-4951-B8B4-61F5E8AD64A9}" type="slidenum">
+            <a:fld id="{C96A11E0-582C-4793-8EC6-B60A649FE65B}" type="slidenum">
               <a:rPr b="0" lang="fr-FR" sz="1400" spc="-1" strike="noStrike">
                 <a:solidFill>
                   <a:srgbClr val="000000"/>
                 </a:solidFill>
                 <a:latin typeface="Times New Roman"/>
               </a:rPr>
-              <a:t>&lt;numéro&gt;</a:t>
+              <a:t>1</a:t>
             </a:fld>
             <a:endParaRPr b="0" lang="fr-FR" sz="1400" spc="-1" strike="noStrike">
               <a:latin typeface="Times New Roman"/>
@@ -9512,14 +9898,14 @@
                 <a:spcPct val="100000"/>
               </a:lnSpc>
             </a:pPr>
-            <a:fld id="{7021D197-786F-431E-B852-AD6C24610A8A}" type="slidenum">
+            <a:fld id="{208517B6-4A03-4D43-A769-FF3F7F1FE35D}" type="slidenum">
               <a:rPr b="0" lang="fr-FR" sz="1400" spc="-1" strike="noStrike">
                 <a:solidFill>
                   <a:srgbClr val="000000"/>
                 </a:solidFill>
                 <a:latin typeface="Times New Roman"/>
               </a:rPr>
-              <a:t>&lt;numéro&gt;</a:t>
+              <a:t>1</a:t>
             </a:fld>
             <a:endParaRPr b="0" lang="fr-FR" sz="1400" spc="-1" strike="noStrike">
               <a:latin typeface="Times New Roman"/>
@@ -9971,7 +10357,7 @@
                 <a:spcPct val="100000"/>
               </a:lnSpc>
             </a:pPr>
-            <a:fld id="{A429B49F-2C2D-4717-B1CA-B9482E81E758}" type="slidenum">
+            <a:fld id="{7A783A8E-B636-4F1D-9B6D-CFF78BE03EB0}" type="slidenum">
               <a:rPr b="0" lang="fr-FR" sz="1400" spc="-1" strike="noStrike">
                 <a:solidFill>
                   <a:srgbClr val="000000"/>
@@ -11275,168 +11661,6 @@
 </p:sld>
 </file>
 
-<file path=ppt/slides/slide9.xml><?xml version="1.0" encoding="utf-8"?>
-<p:sld xmlns:a="http://schemas.openxmlformats.org/drawingml/2006/main" xmlns:p="http://schemas.openxmlformats.org/presentationml/2006/main" xmlns:r="http://schemas.openxmlformats.org/officeDocument/2006/relationships" xmlns:p14="http://schemas.microsoft.com/office/powerpoint/2010/main" xmlns:p15="http://schemas.microsoft.com/office/powerpoint/2012/main" xmlns:mc="http://schemas.openxmlformats.org/markup-compatibility/2006">
-  <p:cSld>
-    <p:spTree>
-      <p:nvGrpSpPr>
-        <p:cNvPr id="1" name=""/>
-        <p:cNvGrpSpPr/>
-        <p:nvPr/>
-      </p:nvGrpSpPr>
-      <p:grpSpPr>
-        <a:xfrm>
-          <a:off x="0" y="0"/>
-          <a:ext cx="0" cy="0"/>
-          <a:chOff x="0" y="0"/>
-          <a:chExt cx="0" cy="0"/>
-        </a:xfrm>
-      </p:grpSpPr>
-      <p:sp>
-        <p:nvSpPr>
-          <p:cNvPr id="95" name="TextShape 1"/>
-          <p:cNvSpPr txBox="1"/>
-          <p:nvPr/>
-        </p:nvSpPr>
-        <p:spPr>
-          <a:xfrm>
-            <a:off x="6553080" y="6248520"/>
-            <a:ext cx="1904760" cy="456840"/>
-          </a:xfrm>
-          <a:prstGeom prst="rect">
-            <a:avLst/>
-          </a:prstGeom>
-          <a:noFill/>
-          <a:ln>
-            <a:noFill/>
-          </a:ln>
-        </p:spPr>
-        <p:txBody>
-          <a:bodyPr/>
-          <a:p>
-            <a:pPr algn="r">
-              <a:lnSpc>
-                <a:spcPct val="100000"/>
-              </a:lnSpc>
-            </a:pPr>
-            <a:fld id="{BCBD32B3-A869-4613-80B9-1D0B6696F189}" type="slidenum">
-              <a:rPr b="0" lang="fr-FR" sz="1400" spc="-1" strike="noStrike">
-                <a:solidFill>
-                  <a:srgbClr val="000000"/>
-                </a:solidFill>
-                <a:latin typeface="Times New Roman"/>
-              </a:rPr>
-              <a:t>&lt;numéro&gt;</a:t>
-            </a:fld>
-            <a:endParaRPr b="0" lang="fr-FR" sz="1400" spc="-1" strike="noStrike">
-              <a:latin typeface="Times New Roman"/>
-            </a:endParaRPr>
-          </a:p>
-        </p:txBody>
-      </p:sp>
-      <p:pic>
-        <p:nvPicPr>
-          <p:cNvPr id="96" name="Picture 8" descr=""/>
-          <p:cNvPicPr/>
-          <p:nvPr/>
-        </p:nvPicPr>
-        <p:blipFill>
-          <a:blip r:embed="rId1"/>
-          <a:stretch/>
-        </p:blipFill>
-        <p:spPr>
-          <a:xfrm>
-            <a:off x="1403640" y="4726080"/>
-            <a:ext cx="1545840" cy="312840"/>
-          </a:xfrm>
-          <a:prstGeom prst="rect">
-            <a:avLst/>
-          </a:prstGeom>
-          <a:ln>
-            <a:noFill/>
-          </a:ln>
-        </p:spPr>
-      </p:pic>
-    </p:spTree>
-  </p:cSld>
-  <p:timing>
-    <p:tnLst>
-      <p:par>
-        <p:cTn id="17" dur="indefinite" restart="never" nodeType="tmRoot">
-          <p:childTnLst>
-            <p:seq>
-              <p:cTn id="18" dur="indefinite" nodeType="mainSeq">
-                <p:childTnLst>
-                  <p:par>
-                    <p:cTn id="19" fill="hold">
-                      <p:stCondLst>
-                        <p:cond delay="0"/>
-                      </p:stCondLst>
-                      <p:childTnLst>
-                        <p:par>
-                          <p:cTn id="20" fill="hold">
-                            <p:stCondLst>
-                              <p:cond delay="0"/>
-                            </p:stCondLst>
-                            <p:childTnLst>
-                              <p:par>
-                                <p:cTn id="21" nodeType="withEffect" fill="hold" presetClass="entr" presetID="1">
-                                  <p:stCondLst>
-                                    <p:cond delay="0"/>
-                                  </p:stCondLst>
-                                  <p:childTnLst>
-                                    <p:set>
-                                      <p:cBhvr>
-                                        <p:cTn id="22" dur="1" fill="hold">
-                                          <p:stCondLst>
-                                            <p:cond delay="0"/>
-                                          </p:stCondLst>
-                                        </p:cTn>
-                                        <p:tgtEl>
-                                          <p:spTgt spid="96"/>
-                                        </p:tgtEl>
-                                        <p:attrNameLst>
-                                          <p:attrName>style.visibility</p:attrName>
-                                        </p:attrNameLst>
-                                      </p:cBhvr>
-                                      <p:to>
-                                        <p:strVal val="visible"/>
-                                      </p:to>
-                                    </p:set>
-                                  </p:childTnLst>
-                                </p:cTn>
-                              </p:par>
-                            </p:childTnLst>
-                          </p:cTn>
-                        </p:par>
-                      </p:childTnLst>
-                    </p:cTn>
-                  </p:par>
-                </p:childTnLst>
-              </p:cTn>
-              <p:prevCondLst>
-                <p:cond delay="0" evt="onPrev">
-                  <p:tgtEl>
-                    <p:sldTgt/>
-                  </p:tgtEl>
-                </p:cond>
-              </p:prevCondLst>
-              <p:nextCondLst>
-                <p:cond delay="0" evt="onNext">
-                  <p:tgtEl>
-                    <p:sldTgt/>
-                  </p:tgtEl>
-                </p:cond>
-              </p:nextCondLst>
-            </p:seq>
-          </p:childTnLst>
-        </p:cTn>
-      </p:par>
-    </p:tnLst>
-  </p:timing>
-</p:sld>
-</file>
-
 <file path=ppt/theme/theme1.xml><?xml version="1.0" encoding="utf-8"?>
 <a:theme xmlns:a="http://schemas.openxmlformats.org/drawingml/2006/main" name="Office Theme">
   <a:themeElements>

</xml_diff>